<commit_message>
Slide "Integration of Haystack vocabulary in iot.schema.org" has been updated.
</commit_message>
<xml_diff>
--- a/iot.schema.org-28062018.pptx
+++ b/iot.schema.org-28062018.pptx
@@ -14,7 +14,7 @@
     <p:sldId id="277" r:id="rId8"/>
     <p:sldId id="262" r:id="rId9"/>
     <p:sldId id="267" r:id="rId10"/>
-    <p:sldId id="268" r:id="rId11"/>
+    <p:sldId id="280" r:id="rId11"/>
     <p:sldId id="265" r:id="rId12"/>
     <p:sldId id="266" r:id="rId13"/>
     <p:sldId id="278" r:id="rId14"/>
@@ -3206,14 +3206,18 @@
           <a:p>
             <a:r>
               <a:rPr lang="en-US" sz="3200" dirty="0" smtClean="0"/>
-              <a:t>Update: Integration of Haystack vocabulary in iot.schema.org</a:t>
+              <a:t>New: </a:t>
+            </a:r>
+            <a:r>
+              <a:rPr lang="en-US" sz="3200" dirty="0" smtClean="0"/>
+              <a:t>Integration of Haystack vocabulary in iot.schema.org</a:t>
             </a:r>
           </a:p>
         </p:txBody>
       </p:sp>
       <p:pic>
         <p:nvPicPr>
-          <p:cNvPr id="1026" name="Picture 2" descr="D:\Work\Work on WoT Embedded Semantic Framework\Repositories\siemens-semantic-models\Haystack-iot.schema\Haystack-iotschema.png"/>
+          <p:cNvPr id="3" name="Picture 2" descr="D:\Work\Work on WoT Embedded Semantic Framework\Repositories\siemens-semantic-models\iot.schema.org\Haystack-iot.schema\Haystack-iotschema-2.png"/>
           <p:cNvPicPr>
             <a:picLocks noChangeAspect="1" noChangeArrowheads="1"/>
           </p:cNvPicPr>
@@ -3228,8 +3232,8 @@
         </p:blipFill>
         <p:spPr bwMode="auto">
           <a:xfrm>
-            <a:off x="1115616" y="1484784"/>
-            <a:ext cx="6984776" cy="5128063"/>
+            <a:off x="1116000" y="1483200"/>
+            <a:ext cx="6983419" cy="5130000"/>
           </a:xfrm>
           <a:prstGeom prst="rect">
             <a:avLst/>
@@ -3237,140 +3241,6 @@
           <a:noFill/>
         </p:spPr>
       </p:pic>
-      <p:sp>
-        <p:nvSpPr>
-          <p:cNvPr id="4" name="TextBox 3"/>
-          <p:cNvSpPr txBox="1"/>
-          <p:nvPr/>
-        </p:nvSpPr>
-        <p:spPr>
-          <a:xfrm>
-            <a:off x="4572000" y="2420888"/>
-            <a:ext cx="4578626" cy="338554"/>
-          </a:xfrm>
-          <a:prstGeom prst="rect">
-            <a:avLst/>
-          </a:prstGeom>
-          <a:noFill/>
-        </p:spPr>
-        <p:txBody>
-          <a:bodyPr wrap="none" rtlCol="0">
-            <a:spAutoFit/>
-          </a:bodyPr>
-          <a:lstStyle/>
-          <a:p>
-            <a:r>
-              <a:rPr lang="en-US" sz="1600" dirty="0" smtClean="0">
-                <a:solidFill>
-                  <a:srgbClr val="FF0000"/>
-                </a:solidFill>
-              </a:rPr>
-              <a:t>Alignment between sp and Event should be removed</a:t>
-            </a:r>
-            <a:endParaRPr lang="en-US" sz="1600" dirty="0">
-              <a:solidFill>
-                <a:srgbClr val="FF0000"/>
-              </a:solidFill>
-            </a:endParaRPr>
-          </a:p>
-        </p:txBody>
-      </p:sp>
-      <p:sp>
-        <p:nvSpPr>
-          <p:cNvPr id="5" name="TextBox 4"/>
-          <p:cNvSpPr txBox="1"/>
-          <p:nvPr/>
-        </p:nvSpPr>
-        <p:spPr>
-          <a:xfrm>
-            <a:off x="1187624" y="5560665"/>
-            <a:ext cx="7380354" cy="584775"/>
-          </a:xfrm>
-          <a:prstGeom prst="rect">
-            <a:avLst/>
-          </a:prstGeom>
-          <a:noFill/>
-        </p:spPr>
-        <p:txBody>
-          <a:bodyPr wrap="none" rtlCol="0">
-            <a:spAutoFit/>
-          </a:bodyPr>
-          <a:lstStyle/>
-          <a:p>
-            <a:r>
-              <a:rPr lang="en-US" sz="1600" dirty="0" smtClean="0">
-                <a:solidFill>
-                  <a:srgbClr val="FF0000"/>
-                </a:solidFill>
-              </a:rPr>
-              <a:t>Equip should be aligned with </a:t>
-            </a:r>
-            <a:r>
-              <a:rPr lang="en-US" sz="1600" dirty="0" err="1" smtClean="0">
-                <a:solidFill>
-                  <a:srgbClr val="FF0000"/>
-                </a:solidFill>
-              </a:rPr>
-              <a:t>FeatureOfInterest</a:t>
-            </a:r>
-            <a:r>
-              <a:rPr lang="en-US" sz="1600" dirty="0" smtClean="0">
-                <a:solidFill>
-                  <a:srgbClr val="FF0000"/>
-                </a:solidFill>
-              </a:rPr>
-              <a:t>, and new relation should be introduced</a:t>
-            </a:r>
-          </a:p>
-          <a:p>
-            <a:r>
-              <a:rPr lang="en-US" sz="1600" dirty="0" smtClean="0">
-                <a:solidFill>
-                  <a:srgbClr val="FF0000"/>
-                </a:solidFill>
-              </a:rPr>
-              <a:t>“Capability” “</a:t>
-            </a:r>
-            <a:r>
-              <a:rPr lang="en-US" sz="1600" dirty="0" err="1" smtClean="0">
-                <a:solidFill>
-                  <a:srgbClr val="FF0000"/>
-                </a:solidFill>
-              </a:rPr>
-              <a:t>isAssociatedWith</a:t>
-            </a:r>
-            <a:r>
-              <a:rPr lang="en-US" sz="1600" dirty="0" smtClean="0">
-                <a:solidFill>
-                  <a:srgbClr val="FF0000"/>
-                </a:solidFill>
-              </a:rPr>
-              <a:t>” “</a:t>
-            </a:r>
-            <a:r>
-              <a:rPr lang="en-US" sz="1600" dirty="0" err="1" smtClean="0">
-                <a:solidFill>
-                  <a:srgbClr val="FF0000"/>
-                </a:solidFill>
-              </a:rPr>
-              <a:t>FeatureOfInterest</a:t>
-            </a:r>
-            <a:r>
-              <a:rPr lang="en-US" sz="1600" dirty="0" smtClean="0">
-                <a:solidFill>
-                  <a:srgbClr val="FF0000"/>
-                </a:solidFill>
-              </a:rPr>
-              <a:t>”</a:t>
-            </a:r>
-            <a:endParaRPr lang="en-US" sz="1600" dirty="0">
-              <a:solidFill>
-                <a:srgbClr val="FF0000"/>
-              </a:solidFill>
-            </a:endParaRPr>
-          </a:p>
-        </p:txBody>
-      </p:sp>
     </p:spTree>
   </p:cSld>
   <p:clrMapOvr>
@@ -7215,7 +7085,11 @@
           <a:p>
             <a:r>
               <a:rPr lang="en-US" sz="3200" dirty="0" smtClean="0"/>
-              <a:t>Update: Integration of Haystack vocabulary in iot.schema.org</a:t>
+              <a:t>Old: </a:t>
+            </a:r>
+            <a:r>
+              <a:rPr lang="en-US" sz="3200" dirty="0" smtClean="0"/>
+              <a:t>Integration of Haystack vocabulary in iot.schema.org</a:t>
             </a:r>
           </a:p>
         </p:txBody>

</xml_diff>

<commit_message>
Small corrections (e.g., typos) in slides corrected.
</commit_message>
<xml_diff>
--- a/iot.schema.org-28062018.pptx
+++ b/iot.schema.org-28062018.pptx
@@ -3206,11 +3206,7 @@
           <a:p>
             <a:r>
               <a:rPr lang="en-US" sz="3200" dirty="0" smtClean="0"/>
-              <a:t>New: </a:t>
-            </a:r>
-            <a:r>
-              <a:rPr lang="en-US" sz="3200" dirty="0" smtClean="0"/>
-              <a:t>Integration of Haystack vocabulary in iot.schema.org</a:t>
+              <a:t>New: Integration of Haystack vocabulary in iot.schema.org</a:t>
             </a:r>
           </a:p>
         </p:txBody>
@@ -4249,7 +4245,7 @@
       </p:sp>
       <p:pic>
         <p:nvPicPr>
-          <p:cNvPr id="2051" name="Picture 3" descr="D:\Work\Work on WoT Embedded Semantic Framework\Repositories\siemens-semantic-models\Haystack-iot.schema\Feature-Of-Interest-Pattern.png"/>
+          <p:cNvPr id="1026" name="Picture 2" descr="D:\Work\Work on WoT Embedded Semantic Framework\Repositories\siemens-semantic-models\iot.schema.org\Haystack-iot.schema\Feature-Of-Interest-Pattern.png"/>
           <p:cNvPicPr>
             <a:picLocks noChangeAspect="1" noChangeArrowheads="1"/>
           </p:cNvPicPr>
@@ -4264,8 +4260,8 @@
         </p:blipFill>
         <p:spPr bwMode="auto">
           <a:xfrm>
-            <a:off x="827584" y="1484783"/>
-            <a:ext cx="7488832" cy="4758661"/>
+            <a:off x="1128953" y="1412776"/>
+            <a:ext cx="7025895" cy="4464496"/>
           </a:xfrm>
           <a:prstGeom prst="rect">
             <a:avLst/>
@@ -6471,8 +6467,12 @@
           <a:lstStyle/>
           <a:p>
             <a:r>
-              <a:rPr lang="en-US" sz="1800" dirty="0" smtClean="0"/>
-              <a:t>Quantity is missing in Brick schema. A quantity is a measure of an observable phenomenon, that, when associated with something, becomes a property of that thing.</a:t>
+              <a:rPr lang="en-US" sz="1800" smtClean="0"/>
+              <a:t>A </a:t>
+            </a:r>
+            <a:r>
+              <a:rPr lang="en-US" sz="1800" dirty="0" smtClean="0"/>
+              <a:t>quantity is a measure of an observable phenomenon, that, when associated with something, becomes a property of that thing.</a:t>
             </a:r>
           </a:p>
           <a:p>
@@ -7085,11 +7085,7 @@
           <a:p>
             <a:r>
               <a:rPr lang="en-US" sz="3200" dirty="0" smtClean="0"/>
-              <a:t>Old: </a:t>
-            </a:r>
-            <a:r>
-              <a:rPr lang="en-US" sz="3200" dirty="0" smtClean="0"/>
-              <a:t>Integration of Haystack vocabulary in iot.schema.org</a:t>
+              <a:t>Old: Integration of Haystack vocabulary in iot.schema.org</a:t>
             </a:r>
           </a:p>
         </p:txBody>

</xml_diff>